<commit_message>
Update to Coordinate System PPT
</commit_message>
<xml_diff>
--- a/mechanical/Fox_Plus_SpaceVehicleCoordinateSystem.pptx
+++ b/mechanical/Fox_Plus_SpaceVehicleCoordinateSystem.pptx
@@ -456,7 +456,7 @@
           <a:p>
             <a:fld id="{84344B4D-3D2E-4BA9-803F-9E6494F989E1}" type="datetimeFigureOut">
               <a:rPr lang="en-US" smtClean="0"/>
-              <a:t>8/9/2025</a:t>
+              <a:t>8/10/2025</a:t>
             </a:fld>
             <a:endParaRPr lang="en-US"/>
           </a:p>
@@ -654,7 +654,7 @@
           <a:p>
             <a:fld id="{84344B4D-3D2E-4BA9-803F-9E6494F989E1}" type="datetimeFigureOut">
               <a:rPr lang="en-US" smtClean="0"/>
-              <a:t>8/9/2025</a:t>
+              <a:t>8/10/2025</a:t>
             </a:fld>
             <a:endParaRPr lang="en-US"/>
           </a:p>
@@ -862,7 +862,7 @@
           <a:p>
             <a:fld id="{84344B4D-3D2E-4BA9-803F-9E6494F989E1}" type="datetimeFigureOut">
               <a:rPr lang="en-US" smtClean="0"/>
-              <a:t>8/9/2025</a:t>
+              <a:t>8/10/2025</a:t>
             </a:fld>
             <a:endParaRPr lang="en-US"/>
           </a:p>
@@ -1060,7 +1060,7 @@
           <a:p>
             <a:fld id="{84344B4D-3D2E-4BA9-803F-9E6494F989E1}" type="datetimeFigureOut">
               <a:rPr lang="en-US" smtClean="0"/>
-              <a:t>8/9/2025</a:t>
+              <a:t>8/10/2025</a:t>
             </a:fld>
             <a:endParaRPr lang="en-US"/>
           </a:p>
@@ -1335,7 +1335,7 @@
           <a:p>
             <a:fld id="{84344B4D-3D2E-4BA9-803F-9E6494F989E1}" type="datetimeFigureOut">
               <a:rPr lang="en-US" smtClean="0"/>
-              <a:t>8/9/2025</a:t>
+              <a:t>8/10/2025</a:t>
             </a:fld>
             <a:endParaRPr lang="en-US"/>
           </a:p>
@@ -1600,7 +1600,7 @@
           <a:p>
             <a:fld id="{84344B4D-3D2E-4BA9-803F-9E6494F989E1}" type="datetimeFigureOut">
               <a:rPr lang="en-US" smtClean="0"/>
-              <a:t>8/9/2025</a:t>
+              <a:t>8/10/2025</a:t>
             </a:fld>
             <a:endParaRPr lang="en-US"/>
           </a:p>
@@ -2012,7 +2012,7 @@
           <a:p>
             <a:fld id="{84344B4D-3D2E-4BA9-803F-9E6494F989E1}" type="datetimeFigureOut">
               <a:rPr lang="en-US" smtClean="0"/>
-              <a:t>8/9/2025</a:t>
+              <a:t>8/10/2025</a:t>
             </a:fld>
             <a:endParaRPr lang="en-US"/>
           </a:p>
@@ -2153,7 +2153,7 @@
           <a:p>
             <a:fld id="{84344B4D-3D2E-4BA9-803F-9E6494F989E1}" type="datetimeFigureOut">
               <a:rPr lang="en-US" smtClean="0"/>
-              <a:t>8/9/2025</a:t>
+              <a:t>8/10/2025</a:t>
             </a:fld>
             <a:endParaRPr lang="en-US"/>
           </a:p>
@@ -2266,7 +2266,7 @@
           <a:p>
             <a:fld id="{84344B4D-3D2E-4BA9-803F-9E6494F989E1}" type="datetimeFigureOut">
               <a:rPr lang="en-US" smtClean="0"/>
-              <a:t>8/9/2025</a:t>
+              <a:t>8/10/2025</a:t>
             </a:fld>
             <a:endParaRPr lang="en-US"/>
           </a:p>
@@ -2577,7 +2577,7 @@
           <a:p>
             <a:fld id="{84344B4D-3D2E-4BA9-803F-9E6494F989E1}" type="datetimeFigureOut">
               <a:rPr lang="en-US" smtClean="0"/>
-              <a:t>8/9/2025</a:t>
+              <a:t>8/10/2025</a:t>
             </a:fld>
             <a:endParaRPr lang="en-US"/>
           </a:p>
@@ -2865,7 +2865,7 @@
           <a:p>
             <a:fld id="{84344B4D-3D2E-4BA9-803F-9E6494F989E1}" type="datetimeFigureOut">
               <a:rPr lang="en-US" smtClean="0"/>
-              <a:t>8/9/2025</a:t>
+              <a:t>8/10/2025</a:t>
             </a:fld>
             <a:endParaRPr lang="en-US"/>
           </a:p>
@@ -3106,7 +3106,7 @@
           <a:p>
             <a:fld id="{84344B4D-3D2E-4BA9-803F-9E6494F989E1}" type="datetimeFigureOut">
               <a:rPr lang="en-US" smtClean="0"/>
-              <a:t>8/9/2025</a:t>
+              <a:t>8/10/2025</a:t>
             </a:fld>
             <a:endParaRPr lang="en-US"/>
           </a:p>
@@ -3553,7 +3553,7 @@
         </p:nvCxnSpPr>
         <p:spPr>
           <a:xfrm>
-            <a:off x="6081656" y="4335477"/>
+            <a:off x="5350136" y="4335477"/>
             <a:ext cx="0" cy="1473798"/>
           </a:xfrm>
           <a:prstGeom prst="straightConnector1">
@@ -3592,7 +3592,7 @@
         </p:nvSpPr>
         <p:spPr>
           <a:xfrm>
-            <a:off x="4930454" y="2263454"/>
+            <a:off x="4198934" y="2263454"/>
             <a:ext cx="2331092" cy="2331092"/>
           </a:xfrm>
           <a:prstGeom prst="cube">
@@ -3646,7 +3646,7 @@
         </p:nvCxnSpPr>
         <p:spPr>
           <a:xfrm flipV="1">
-            <a:off x="6118112" y="1121336"/>
+            <a:off x="5386592" y="1121336"/>
             <a:ext cx="0" cy="1375186"/>
           </a:xfrm>
           <a:prstGeom prst="straightConnector1">
@@ -3685,7 +3685,7 @@
         </p:nvSpPr>
         <p:spPr>
           <a:xfrm>
-            <a:off x="6088828" y="5587548"/>
+            <a:off x="5357308" y="5587548"/>
             <a:ext cx="732893" cy="369332"/>
           </a:xfrm>
           <a:prstGeom prst="rect">
@@ -3720,7 +3720,7 @@
         </p:nvSpPr>
         <p:spPr>
           <a:xfrm>
-            <a:off x="6144559" y="959972"/>
+            <a:off x="5413039" y="959972"/>
             <a:ext cx="808235" cy="369332"/>
           </a:xfrm>
           <a:prstGeom prst="rect">
@@ -3755,7 +3755,7 @@
         </p:nvCxnSpPr>
         <p:spPr>
           <a:xfrm flipV="1">
-            <a:off x="1790700" y="3556000"/>
+            <a:off x="1059180" y="3556000"/>
             <a:ext cx="0" cy="1038546"/>
           </a:xfrm>
           <a:prstGeom prst="straightConnector1">
@@ -3799,7 +3799,7 @@
         </p:nvCxnSpPr>
         <p:spPr>
           <a:xfrm>
-            <a:off x="1790700" y="4591692"/>
+            <a:off x="1059180" y="4591692"/>
             <a:ext cx="1022350" cy="0"/>
           </a:xfrm>
           <a:prstGeom prst="straightConnector1">
@@ -3843,7 +3843,7 @@
         </p:nvCxnSpPr>
         <p:spPr>
           <a:xfrm flipH="1">
-            <a:off x="1183341" y="4594546"/>
+            <a:off x="451821" y="4594546"/>
             <a:ext cx="607359" cy="569125"/>
           </a:xfrm>
           <a:prstGeom prst="straightConnector1">
@@ -3885,7 +3885,7 @@
         </p:nvSpPr>
         <p:spPr>
           <a:xfrm>
-            <a:off x="1790700" y="3345628"/>
+            <a:off x="1059180" y="3345628"/>
             <a:ext cx="309700" cy="369332"/>
           </a:xfrm>
           <a:prstGeom prst="rect">
@@ -3920,7 +3920,7 @@
         </p:nvSpPr>
         <p:spPr>
           <a:xfrm>
-            <a:off x="2692949" y="4222360"/>
+            <a:off x="1961429" y="4222360"/>
             <a:ext cx="312906" cy="369332"/>
           </a:xfrm>
           <a:prstGeom prst="rect">
@@ -3955,7 +3955,7 @@
         </p:nvSpPr>
         <p:spPr>
           <a:xfrm>
-            <a:off x="870434" y="4794339"/>
+            <a:off x="138914" y="4794339"/>
             <a:ext cx="312906" cy="369332"/>
           </a:xfrm>
           <a:prstGeom prst="rect">
@@ -4025,7 +4025,7 @@
         </p:nvCxnSpPr>
         <p:spPr>
           <a:xfrm>
-            <a:off x="5518673" y="2263454"/>
+            <a:off x="4787153" y="2263454"/>
             <a:ext cx="0" cy="1752286"/>
           </a:xfrm>
           <a:prstGeom prst="line">
@@ -4069,7 +4069,7 @@
         </p:nvCxnSpPr>
         <p:spPr>
           <a:xfrm flipH="1">
-            <a:off x="5514026" y="4015740"/>
+            <a:off x="4782506" y="4015740"/>
             <a:ext cx="1747520" cy="0"/>
           </a:xfrm>
           <a:prstGeom prst="line">
@@ -4111,7 +4111,7 @@
         </p:nvCxnSpPr>
         <p:spPr>
           <a:xfrm flipV="1">
-            <a:off x="4930454" y="4008120"/>
+            <a:off x="4198934" y="4008120"/>
             <a:ext cx="583572" cy="583572"/>
           </a:xfrm>
           <a:prstGeom prst="line">
@@ -4153,7 +4153,7 @@
         </p:nvGrpSpPr>
         <p:grpSpPr>
           <a:xfrm>
-            <a:off x="5042233" y="3329236"/>
+            <a:off x="4310713" y="3329236"/>
             <a:ext cx="975290" cy="989043"/>
             <a:chOff x="8619563" y="3429000"/>
             <a:chExt cx="975290" cy="989043"/>
@@ -4430,10 +4430,10 @@
       </p:grpSp>
       <p:sp>
         <p:nvSpPr>
-          <p:cNvPr id="2" name="Rectangle: Rounded Corners 1">
-            <a:extLst>
-              <a:ext uri="{FF2B5EF4-FFF2-40B4-BE49-F238E27FC236}">
-                <a16:creationId xmlns:a16="http://schemas.microsoft.com/office/drawing/2014/main" id="{A557DE92-88B1-7B36-4520-14550184CFB5}"/>
+          <p:cNvPr id="8" name="Cube 7">
+            <a:extLst>
+              <a:ext uri="{FF2B5EF4-FFF2-40B4-BE49-F238E27FC236}">
+                <a16:creationId xmlns:a16="http://schemas.microsoft.com/office/drawing/2014/main" id="{87A75EBA-B4BB-926B-1A47-6A251F62D914}"/>
               </a:ext>
             </a:extLst>
           </p:cNvPr>
@@ -4442,10 +4442,10 @@
         </p:nvSpPr>
         <p:spPr>
           <a:xfrm>
-            <a:off x="9339209" y="1019195"/>
-            <a:ext cx="2331091" cy="1160980"/>
+            <a:off x="10088965" y="265224"/>
+            <a:ext cx="1796815" cy="1709562"/>
           </a:xfrm>
-          <a:prstGeom prst="roundRect">
+          <a:prstGeom prst="cube">
             <a:avLst/>
           </a:prstGeom>
         </p:spPr>
@@ -4470,31 +4470,180 @@
           <a:lstStyle/>
           <a:p>
             <a:pPr algn="ctr"/>
+            <a:endParaRPr lang="en-US" dirty="0"/>
+          </a:p>
+        </p:txBody>
+      </p:sp>
+      <p:sp>
+        <p:nvSpPr>
+          <p:cNvPr id="9" name="TextBox 8">
+            <a:extLst>
+              <a:ext uri="{FF2B5EF4-FFF2-40B4-BE49-F238E27FC236}">
+                <a16:creationId xmlns:a16="http://schemas.microsoft.com/office/drawing/2014/main" id="{F368B4D2-FBE8-9664-D386-0072F03636F4}"/>
+              </a:ext>
+            </a:extLst>
+          </p:cNvPr>
+          <p:cNvSpPr txBox="1"/>
+          <p:nvPr/>
+        </p:nvSpPr>
+        <p:spPr>
+          <a:xfrm>
+            <a:off x="10770831" y="297039"/>
+            <a:ext cx="417615" cy="276999"/>
+          </a:xfrm>
+          <a:prstGeom prst="rect">
+            <a:avLst/>
+          </a:prstGeom>
+          <a:noFill/>
+        </p:spPr>
+        <p:txBody>
+          <a:bodyPr wrap="none" rtlCol="0">
+            <a:spAutoFit/>
+          </a:bodyPr>
+          <a:lstStyle/>
+          <a:p>
+            <a:r>
+              <a:rPr lang="en-US" sz="1200" dirty="0">
+                <a:solidFill>
+                  <a:schemeClr val="bg1"/>
+                </a:solidFill>
+              </a:rPr>
+              <a:t>Top</a:t>
+            </a:r>
+          </a:p>
+        </p:txBody>
+      </p:sp>
+      <p:sp>
+        <p:nvSpPr>
+          <p:cNvPr id="12" name="TextBox 11">
+            <a:extLst>
+              <a:ext uri="{FF2B5EF4-FFF2-40B4-BE49-F238E27FC236}">
+                <a16:creationId xmlns:a16="http://schemas.microsoft.com/office/drawing/2014/main" id="{EDEA84BE-24C1-130A-9DC8-2DCF25971026}"/>
+              </a:ext>
+            </a:extLst>
+          </p:cNvPr>
+          <p:cNvSpPr txBox="1"/>
+          <p:nvPr/>
+        </p:nvSpPr>
+        <p:spPr>
+          <a:xfrm>
+            <a:off x="10504699" y="1099366"/>
+            <a:ext cx="532262" cy="276999"/>
+          </a:xfrm>
+          <a:prstGeom prst="rect">
+            <a:avLst/>
+          </a:prstGeom>
+          <a:noFill/>
+        </p:spPr>
+        <p:txBody>
+          <a:bodyPr wrap="none" rtlCol="0">
+            <a:spAutoFit/>
+          </a:bodyPr>
+          <a:lstStyle/>
+          <a:p>
+            <a:pPr algn="ctr"/>
+            <a:r>
+              <a:rPr lang="en-US" sz="1200" dirty="0">
+                <a:solidFill>
+                  <a:schemeClr val="bg1"/>
+                </a:solidFill>
+              </a:rPr>
+              <a:t>Front</a:t>
+            </a:r>
+          </a:p>
+        </p:txBody>
+      </p:sp>
+      <p:sp>
+        <p:nvSpPr>
+          <p:cNvPr id="16" name="TextBox 15">
+            <a:extLst>
+              <a:ext uri="{FF2B5EF4-FFF2-40B4-BE49-F238E27FC236}">
+                <a16:creationId xmlns:a16="http://schemas.microsoft.com/office/drawing/2014/main" id="{4EE41B04-29D2-B78E-668B-FBF0DF2AEA14}"/>
+              </a:ext>
+            </a:extLst>
+          </p:cNvPr>
+          <p:cNvSpPr txBox="1"/>
+          <p:nvPr/>
+        </p:nvSpPr>
+        <p:spPr>
+          <a:xfrm rot="19527335">
+            <a:off x="11408452" y="981504"/>
+            <a:ext cx="524503" cy="276999"/>
+          </a:xfrm>
+          <a:prstGeom prst="rect">
+            <a:avLst/>
+          </a:prstGeom>
+          <a:noFill/>
+        </p:spPr>
+        <p:txBody>
+          <a:bodyPr wrap="none" rtlCol="0">
+            <a:spAutoFit/>
+          </a:bodyPr>
+          <a:lstStyle/>
+          <a:p>
+            <a:pPr algn="ctr"/>
+            <a:r>
+              <a:rPr lang="en-US" sz="1200" dirty="0">
+                <a:solidFill>
+                  <a:schemeClr val="bg1"/>
+                </a:solidFill>
+              </a:rPr>
+              <a:t>Right</a:t>
+            </a:r>
+          </a:p>
+        </p:txBody>
+      </p:sp>
+      <p:sp>
+        <p:nvSpPr>
+          <p:cNvPr id="17" name="TextBox 16">
+            <a:extLst>
+              <a:ext uri="{FF2B5EF4-FFF2-40B4-BE49-F238E27FC236}">
+                <a16:creationId xmlns:a16="http://schemas.microsoft.com/office/drawing/2014/main" id="{86D5CF84-E94C-1B61-04DB-BAFB19DD2EB5}"/>
+              </a:ext>
+            </a:extLst>
+          </p:cNvPr>
+          <p:cNvSpPr txBox="1"/>
+          <p:nvPr/>
+        </p:nvSpPr>
+        <p:spPr>
+          <a:xfrm>
+            <a:off x="3044281" y="2954931"/>
+            <a:ext cx="821059" cy="369332"/>
+          </a:xfrm>
+          <a:prstGeom prst="rect">
+            <a:avLst/>
+          </a:prstGeom>
+          <a:noFill/>
+        </p:spPr>
+        <p:txBody>
+          <a:bodyPr wrap="none" rtlCol="0">
+            <a:spAutoFit/>
+          </a:bodyPr>
+          <a:lstStyle/>
+          <a:p>
             <a:r>
               <a:rPr lang="en-US" dirty="0"/>
-              <a:t>In model space, where is the origin (0,0,0)?</a:t>
+              <a:t>(0,0,0)</a:t>
             </a:r>
           </a:p>
         </p:txBody>
       </p:sp>
       <p:cxnSp>
         <p:nvCxnSpPr>
-          <p:cNvPr id="5" name="Straight Arrow Connector 4">
-            <a:extLst>
-              <a:ext uri="{FF2B5EF4-FFF2-40B4-BE49-F238E27FC236}">
-                <a16:creationId xmlns:a16="http://schemas.microsoft.com/office/drawing/2014/main" id="{5EF92BFE-EA8A-7CE2-E40C-B0FE8C6383A9}"/>
-              </a:ext>
-            </a:extLst>
-          </p:cNvPr>
-          <p:cNvCxnSpPr>
-            <a:stCxn id="2" idx="1"/>
-          </p:cNvCxnSpPr>
+          <p:cNvPr id="23" name="Straight Arrow Connector 22">
+            <a:extLst>
+              <a:ext uri="{FF2B5EF4-FFF2-40B4-BE49-F238E27FC236}">
+                <a16:creationId xmlns:a16="http://schemas.microsoft.com/office/drawing/2014/main" id="{34C413D5-75C8-602E-C66C-E0F4FFF66CF8}"/>
+              </a:ext>
+            </a:extLst>
+          </p:cNvPr>
+          <p:cNvCxnSpPr/>
           <p:nvPr/>
         </p:nvCxnSpPr>
         <p:spPr>
-          <a:xfrm flipH="1">
-            <a:off x="6017523" y="1599685"/>
-            <a:ext cx="3321686" cy="2059199"/>
+          <a:xfrm>
+            <a:off x="3698240" y="3329236"/>
+            <a:ext cx="957205" cy="619711"/>
           </a:xfrm>
           <a:prstGeom prst="straightConnector1">
             <a:avLst/>
@@ -4518,6 +4667,80 @@
           </a:fontRef>
         </p:style>
       </p:cxnSp>
+      <p:sp>
+        <p:nvSpPr>
+          <p:cNvPr id="32" name="TextBox 31">
+            <a:extLst>
+              <a:ext uri="{FF2B5EF4-FFF2-40B4-BE49-F238E27FC236}">
+                <a16:creationId xmlns:a16="http://schemas.microsoft.com/office/drawing/2014/main" id="{73A48BFE-21F2-1FFC-53C4-0CB9C929DE69}"/>
+              </a:ext>
+            </a:extLst>
+          </p:cNvPr>
+          <p:cNvSpPr txBox="1"/>
+          <p:nvPr/>
+        </p:nvSpPr>
+        <p:spPr>
+          <a:xfrm>
+            <a:off x="10272007" y="1950831"/>
+            <a:ext cx="997645" cy="646331"/>
+          </a:xfrm>
+          <a:prstGeom prst="rect">
+            <a:avLst/>
+          </a:prstGeom>
+          <a:noFill/>
+        </p:spPr>
+        <p:txBody>
+          <a:bodyPr wrap="none" rtlCol="0">
+            <a:spAutoFit/>
+          </a:bodyPr>
+          <a:lstStyle/>
+          <a:p>
+            <a:pPr algn="ctr"/>
+            <a:r>
+              <a:rPr lang="en-US" dirty="0"/>
+              <a:t>Inventor</a:t>
+            </a:r>
+          </a:p>
+          <a:p>
+            <a:pPr algn="ctr"/>
+            <a:r>
+              <a:rPr lang="en-US" dirty="0"/>
+              <a:t>Views</a:t>
+            </a:r>
+          </a:p>
+        </p:txBody>
+      </p:sp>
+      <p:pic>
+        <p:nvPicPr>
+          <p:cNvPr id="36" name="Picture 35">
+            <a:extLst>
+              <a:ext uri="{FF2B5EF4-FFF2-40B4-BE49-F238E27FC236}">
+                <a16:creationId xmlns:a16="http://schemas.microsoft.com/office/drawing/2014/main" id="{6AEA6897-42AE-0FBD-31DC-7E2DE34A22E2}"/>
+              </a:ext>
+            </a:extLst>
+          </p:cNvPr>
+          <p:cNvPicPr>
+            <a:picLocks noChangeAspect="1"/>
+          </p:cNvPicPr>
+          <p:nvPr/>
+        </p:nvPicPr>
+        <p:blipFill>
+          <a:blip r:embed="rId2"/>
+          <a:srcRect l="7863"/>
+          <a:stretch>
+            <a:fillRect/>
+          </a:stretch>
+        </p:blipFill>
+        <p:spPr>
+          <a:xfrm>
+            <a:off x="7614939" y="2059271"/>
+            <a:ext cx="2183689" cy="2496639"/>
+          </a:xfrm>
+          <a:prstGeom prst="rect">
+            <a:avLst/>
+          </a:prstGeom>
+        </p:spPr>
+      </p:pic>
     </p:spTree>
     <p:extLst>
       <p:ext uri="{BB962C8B-B14F-4D97-AF65-F5344CB8AC3E}">

</xml_diff>

<commit_message>
Update to SV Coordinate System document
</commit_message>
<xml_diff>
--- a/mechanical/Fox_Plus_SpaceVehicleCoordinateSystem.pptx
+++ b/mechanical/Fox_Plus_SpaceVehicleCoordinateSystem.pptx
@@ -3755,7 +3755,7 @@
         </p:nvCxnSpPr>
         <p:spPr>
           <a:xfrm flipV="1">
-            <a:off x="1059180" y="3556000"/>
+            <a:off x="920266" y="5054600"/>
             <a:ext cx="0" cy="1038546"/>
           </a:xfrm>
           <a:prstGeom prst="straightConnector1">
@@ -3799,7 +3799,7 @@
         </p:nvCxnSpPr>
         <p:spPr>
           <a:xfrm>
-            <a:off x="1059180" y="4591692"/>
+            <a:off x="920266" y="6090292"/>
             <a:ext cx="1022350" cy="0"/>
           </a:xfrm>
           <a:prstGeom prst="straightConnector1">
@@ -3843,7 +3843,7 @@
         </p:nvCxnSpPr>
         <p:spPr>
           <a:xfrm flipH="1">
-            <a:off x="451821" y="4594546"/>
+            <a:off x="312907" y="6093146"/>
             <a:ext cx="607359" cy="569125"/>
           </a:xfrm>
           <a:prstGeom prst="straightConnector1">
@@ -3885,7 +3885,7 @@
         </p:nvSpPr>
         <p:spPr>
           <a:xfrm>
-            <a:off x="1059180" y="3345628"/>
+            <a:off x="920266" y="4844228"/>
             <a:ext cx="309700" cy="369332"/>
           </a:xfrm>
           <a:prstGeom prst="rect">
@@ -3920,7 +3920,7 @@
         </p:nvSpPr>
         <p:spPr>
           <a:xfrm>
-            <a:off x="1961429" y="4222360"/>
+            <a:off x="1822515" y="5720960"/>
             <a:ext cx="312906" cy="369332"/>
           </a:xfrm>
           <a:prstGeom prst="rect">
@@ -3955,7 +3955,7 @@
         </p:nvSpPr>
         <p:spPr>
           <a:xfrm>
-            <a:off x="138914" y="4794339"/>
+            <a:off x="0" y="6292939"/>
             <a:ext cx="312906" cy="369332"/>
           </a:xfrm>
           <a:prstGeom prst="rect">
@@ -4139,295 +4139,255 @@
           </a:fontRef>
         </p:style>
       </p:cxnSp>
-      <p:grpSp>
-        <p:nvGrpSpPr>
-          <p:cNvPr id="31" name="Group 30">
-            <a:extLst>
-              <a:ext uri="{FF2B5EF4-FFF2-40B4-BE49-F238E27FC236}">
-                <a16:creationId xmlns:a16="http://schemas.microsoft.com/office/drawing/2014/main" id="{91AB7F38-BCCF-2550-A127-FFD2F790CA0E}"/>
-              </a:ext>
-            </a:extLst>
-          </p:cNvPr>
-          <p:cNvGrpSpPr/>
+      <p:cxnSp>
+        <p:nvCxnSpPr>
+          <p:cNvPr id="24" name="Straight Arrow Connector 23">
+            <a:extLst>
+              <a:ext uri="{FF2B5EF4-FFF2-40B4-BE49-F238E27FC236}">
+                <a16:creationId xmlns:a16="http://schemas.microsoft.com/office/drawing/2014/main" id="{0226330A-9CCF-18DB-3BF1-661DBDC5F2E1}"/>
+              </a:ext>
+            </a:extLst>
+          </p:cNvPr>
+          <p:cNvCxnSpPr>
+            <a:cxnSpLocks/>
+          </p:cNvCxnSpPr>
           <p:nvPr/>
-        </p:nvGrpSpPr>
-        <p:grpSpPr>
+        </p:nvCxnSpPr>
+        <p:spPr>
+          <a:xfrm flipH="1">
+            <a:off x="5353685" y="3556000"/>
+            <a:ext cx="3623" cy="600075"/>
+          </a:xfrm>
+          <a:prstGeom prst="straightConnector1">
+            <a:avLst/>
+          </a:prstGeom>
+          <a:ln w="38100">
+            <a:solidFill>
+              <a:schemeClr val="accent4"/>
+            </a:solidFill>
+            <a:tailEnd type="arrow"/>
+          </a:ln>
+        </p:spPr>
+        <p:style>
+          <a:lnRef idx="2">
+            <a:schemeClr val="accent1"/>
+          </a:lnRef>
+          <a:fillRef idx="0">
+            <a:schemeClr val="accent1"/>
+          </a:fillRef>
+          <a:effectRef idx="1">
+            <a:schemeClr val="accent1"/>
+          </a:effectRef>
+          <a:fontRef idx="minor">
+            <a:schemeClr val="tx1"/>
+          </a:fontRef>
+        </p:style>
+      </p:cxnSp>
+      <p:cxnSp>
+        <p:nvCxnSpPr>
+          <p:cNvPr id="25" name="Straight Arrow Connector 24">
+            <a:extLst>
+              <a:ext uri="{FF2B5EF4-FFF2-40B4-BE49-F238E27FC236}">
+                <a16:creationId xmlns:a16="http://schemas.microsoft.com/office/drawing/2014/main" id="{E6763739-0FDB-76BF-0D34-203D276E4AF5}"/>
+              </a:ext>
+            </a:extLst>
+          </p:cNvPr>
+          <p:cNvCxnSpPr>
+            <a:cxnSpLocks/>
+          </p:cNvCxnSpPr>
+          <p:nvPr/>
+        </p:nvCxnSpPr>
+        <p:spPr>
           <a:xfrm>
-            <a:off x="4310713" y="3329236"/>
-            <a:ext cx="975290" cy="989043"/>
-            <a:chOff x="8619563" y="3429000"/>
-            <a:chExt cx="975290" cy="989043"/>
-          </a:xfrm>
-        </p:grpSpPr>
-        <p:grpSp>
-          <p:nvGrpSpPr>
-            <p:cNvPr id="27" name="Group 26">
-              <a:extLst>
-                <a:ext uri="{FF2B5EF4-FFF2-40B4-BE49-F238E27FC236}">
-                  <a16:creationId xmlns:a16="http://schemas.microsoft.com/office/drawing/2014/main" id="{6999FBD0-77C9-0C81-3498-B6BFED9B5D41}"/>
-                </a:ext>
-              </a:extLst>
-            </p:cNvPr>
-            <p:cNvGrpSpPr/>
-            <p:nvPr/>
-          </p:nvGrpSpPr>
-          <p:grpSpPr>
-            <a:xfrm>
-              <a:off x="8855336" y="3758648"/>
-              <a:ext cx="584737" cy="576830"/>
-              <a:chOff x="8855336" y="3758647"/>
-              <a:chExt cx="1629709" cy="1607671"/>
-            </a:xfrm>
-          </p:grpSpPr>
-          <p:cxnSp>
-            <p:nvCxnSpPr>
-              <p:cNvPr id="24" name="Straight Arrow Connector 23">
-                <a:extLst>
-                  <a:ext uri="{FF2B5EF4-FFF2-40B4-BE49-F238E27FC236}">
-                    <a16:creationId xmlns:a16="http://schemas.microsoft.com/office/drawing/2014/main" id="{0226330A-9CCF-18DB-3BF1-661DBDC5F2E1}"/>
-                  </a:ext>
-                </a:extLst>
-              </p:cNvPr>
-              <p:cNvCxnSpPr/>
-              <p:nvPr/>
-            </p:nvCxnSpPr>
-            <p:spPr>
-              <a:xfrm flipV="1">
-                <a:off x="9462695" y="3758647"/>
-                <a:ext cx="0" cy="1038546"/>
-              </a:xfrm>
-              <a:prstGeom prst="straightConnector1">
-                <a:avLst/>
-              </a:prstGeom>
-              <a:ln w="38100">
+            <a:off x="5353685" y="3573289"/>
+            <a:ext cx="521598" cy="1024"/>
+          </a:xfrm>
+          <a:prstGeom prst="straightConnector1">
+            <a:avLst/>
+          </a:prstGeom>
+          <a:ln w="38100">
+            <a:solidFill>
+              <a:schemeClr val="accent4"/>
+            </a:solidFill>
+            <a:tailEnd type="arrow"/>
+          </a:ln>
+        </p:spPr>
+        <p:style>
+          <a:lnRef idx="2">
+            <a:schemeClr val="accent1"/>
+          </a:lnRef>
+          <a:fillRef idx="0">
+            <a:schemeClr val="accent1"/>
+          </a:fillRef>
+          <a:effectRef idx="1">
+            <a:schemeClr val="accent1"/>
+          </a:effectRef>
+          <a:fontRef idx="minor">
+            <a:schemeClr val="tx1"/>
+          </a:fontRef>
+        </p:style>
+      </p:cxnSp>
+      <p:cxnSp>
+        <p:nvCxnSpPr>
+          <p:cNvPr id="26" name="Straight Arrow Connector 25">
+            <a:extLst>
+              <a:ext uri="{FF2B5EF4-FFF2-40B4-BE49-F238E27FC236}">
+                <a16:creationId xmlns:a16="http://schemas.microsoft.com/office/drawing/2014/main" id="{63D9C32F-29D7-2402-D151-4F08CBCF9B96}"/>
+              </a:ext>
+            </a:extLst>
+          </p:cNvPr>
+          <p:cNvCxnSpPr>
+            <a:cxnSpLocks/>
+          </p:cNvCxnSpPr>
+          <p:nvPr/>
+        </p:nvCxnSpPr>
+        <p:spPr>
+          <a:xfrm flipH="1">
+            <a:off x="5003800" y="3574313"/>
+            <a:ext cx="349885" cy="343637"/>
+          </a:xfrm>
+          <a:prstGeom prst="straightConnector1">
+            <a:avLst/>
+          </a:prstGeom>
+          <a:ln w="38100">
+            <a:solidFill>
+              <a:schemeClr val="accent4"/>
+            </a:solidFill>
+            <a:tailEnd type="arrow"/>
+          </a:ln>
+        </p:spPr>
+        <p:style>
+          <a:lnRef idx="2">
+            <a:schemeClr val="accent1"/>
+          </a:lnRef>
+          <a:fillRef idx="0">
+            <a:schemeClr val="accent1"/>
+          </a:fillRef>
+          <a:effectRef idx="1">
+            <a:schemeClr val="accent1"/>
+          </a:effectRef>
+          <a:fontRef idx="minor">
+            <a:schemeClr val="tx1"/>
+          </a:fontRef>
+        </p:style>
+      </p:cxnSp>
+      <p:sp>
+        <p:nvSpPr>
+          <p:cNvPr id="28" name="TextBox 27">
+            <a:extLst>
+              <a:ext uri="{FF2B5EF4-FFF2-40B4-BE49-F238E27FC236}">
+                <a16:creationId xmlns:a16="http://schemas.microsoft.com/office/drawing/2014/main" id="{FA727133-D6B4-1578-468B-5C164CF6064F}"/>
+              </a:ext>
+            </a:extLst>
+          </p:cNvPr>
+          <p:cNvSpPr txBox="1"/>
+          <p:nvPr/>
+        </p:nvSpPr>
+        <p:spPr>
+          <a:xfrm>
+            <a:off x="4779168" y="3611386"/>
+            <a:ext cx="288862" cy="369332"/>
+          </a:xfrm>
+          <a:prstGeom prst="rect">
+            <a:avLst/>
+          </a:prstGeom>
+          <a:noFill/>
+        </p:spPr>
+        <p:txBody>
+          <a:bodyPr wrap="none" rtlCol="0">
+            <a:spAutoFit/>
+          </a:bodyPr>
+          <a:lstStyle/>
+          <a:p>
+            <a:r>
+              <a:rPr lang="en-US" dirty="0">
                 <a:solidFill>
-                  <a:schemeClr val="accent4"/>
+                  <a:srgbClr val="00B0F0"/>
                 </a:solidFill>
-                <a:tailEnd type="arrow"/>
-              </a:ln>
-            </p:spPr>
-            <p:style>
-              <a:lnRef idx="2">
-                <a:schemeClr val="accent1"/>
-              </a:lnRef>
-              <a:fillRef idx="0">
-                <a:schemeClr val="accent1"/>
-              </a:fillRef>
-              <a:effectRef idx="1">
-                <a:schemeClr val="accent1"/>
-              </a:effectRef>
-              <a:fontRef idx="minor">
-                <a:schemeClr val="tx1"/>
-              </a:fontRef>
-            </p:style>
-          </p:cxnSp>
-          <p:cxnSp>
-            <p:nvCxnSpPr>
-              <p:cNvPr id="25" name="Straight Arrow Connector 24">
-                <a:extLst>
-                  <a:ext uri="{FF2B5EF4-FFF2-40B4-BE49-F238E27FC236}">
-                    <a16:creationId xmlns:a16="http://schemas.microsoft.com/office/drawing/2014/main" id="{E6763739-0FDB-76BF-0D34-203D276E4AF5}"/>
-                  </a:ext>
-                </a:extLst>
-              </p:cNvPr>
-              <p:cNvCxnSpPr>
-                <a:cxnSpLocks/>
-              </p:cNvCxnSpPr>
-              <p:nvPr/>
-            </p:nvCxnSpPr>
-            <p:spPr>
-              <a:xfrm>
-                <a:off x="9462695" y="4794339"/>
-                <a:ext cx="1022350" cy="0"/>
-              </a:xfrm>
-              <a:prstGeom prst="straightConnector1">
-                <a:avLst/>
-              </a:prstGeom>
-              <a:ln w="38100">
+              </a:rPr>
+              <a:t>y</a:t>
+            </a:r>
+          </a:p>
+        </p:txBody>
+      </p:sp>
+      <p:sp>
+        <p:nvSpPr>
+          <p:cNvPr id="29" name="TextBox 28">
+            <a:extLst>
+              <a:ext uri="{FF2B5EF4-FFF2-40B4-BE49-F238E27FC236}">
+                <a16:creationId xmlns:a16="http://schemas.microsoft.com/office/drawing/2014/main" id="{70EDFAA1-46FF-CB31-372E-35E2351A9A4E}"/>
+              </a:ext>
+            </a:extLst>
+          </p:cNvPr>
+          <p:cNvSpPr txBox="1"/>
+          <p:nvPr/>
+        </p:nvSpPr>
+        <p:spPr>
+          <a:xfrm>
+            <a:off x="5689315" y="3260015"/>
+            <a:ext cx="287258" cy="369332"/>
+          </a:xfrm>
+          <a:prstGeom prst="rect">
+            <a:avLst/>
+          </a:prstGeom>
+          <a:noFill/>
+        </p:spPr>
+        <p:txBody>
+          <a:bodyPr wrap="none" rtlCol="0">
+            <a:spAutoFit/>
+          </a:bodyPr>
+          <a:lstStyle/>
+          <a:p>
+            <a:r>
+              <a:rPr lang="en-US" dirty="0">
                 <a:solidFill>
-                  <a:schemeClr val="accent4"/>
+                  <a:srgbClr val="00B0F0"/>
                 </a:solidFill>
-                <a:tailEnd type="arrow"/>
-              </a:ln>
-            </p:spPr>
-            <p:style>
-              <a:lnRef idx="2">
-                <a:schemeClr val="accent1"/>
-              </a:lnRef>
-              <a:fillRef idx="0">
-                <a:schemeClr val="accent1"/>
-              </a:fillRef>
-              <a:effectRef idx="1">
-                <a:schemeClr val="accent1"/>
-              </a:effectRef>
-              <a:fontRef idx="minor">
-                <a:schemeClr val="tx1"/>
-              </a:fontRef>
-            </p:style>
-          </p:cxnSp>
-          <p:cxnSp>
-            <p:nvCxnSpPr>
-              <p:cNvPr id="26" name="Straight Arrow Connector 25">
-                <a:extLst>
-                  <a:ext uri="{FF2B5EF4-FFF2-40B4-BE49-F238E27FC236}">
-                    <a16:creationId xmlns:a16="http://schemas.microsoft.com/office/drawing/2014/main" id="{63D9C32F-29D7-2402-D151-4F08CBCF9B96}"/>
-                  </a:ext>
-                </a:extLst>
-              </p:cNvPr>
-              <p:cNvCxnSpPr>
-                <a:cxnSpLocks/>
-              </p:cNvCxnSpPr>
-              <p:nvPr/>
-            </p:nvCxnSpPr>
-            <p:spPr>
-              <a:xfrm flipH="1">
-                <a:off x="8855336" y="4797193"/>
-                <a:ext cx="607359" cy="569125"/>
-              </a:xfrm>
-              <a:prstGeom prst="straightConnector1">
-                <a:avLst/>
-              </a:prstGeom>
-              <a:ln w="38100">
+              </a:rPr>
+              <a:t>x</a:t>
+            </a:r>
+          </a:p>
+        </p:txBody>
+      </p:sp>
+      <p:sp>
+        <p:nvSpPr>
+          <p:cNvPr id="30" name="TextBox 29">
+            <a:extLst>
+              <a:ext uri="{FF2B5EF4-FFF2-40B4-BE49-F238E27FC236}">
+                <a16:creationId xmlns:a16="http://schemas.microsoft.com/office/drawing/2014/main" id="{B378A719-558C-81EF-810E-B474F1236D01}"/>
+              </a:ext>
+            </a:extLst>
+          </p:cNvPr>
+          <p:cNvSpPr txBox="1"/>
+          <p:nvPr/>
+        </p:nvSpPr>
+        <p:spPr>
+          <a:xfrm>
+            <a:off x="5322144" y="3945696"/>
+            <a:ext cx="285656" cy="369332"/>
+          </a:xfrm>
+          <a:prstGeom prst="rect">
+            <a:avLst/>
+          </a:prstGeom>
+          <a:noFill/>
+        </p:spPr>
+        <p:txBody>
+          <a:bodyPr wrap="none" rtlCol="0">
+            <a:spAutoFit/>
+          </a:bodyPr>
+          <a:lstStyle/>
+          <a:p>
+            <a:r>
+              <a:rPr lang="en-US" dirty="0">
                 <a:solidFill>
-                  <a:schemeClr val="accent4"/>
+                  <a:srgbClr val="00B0F0"/>
                 </a:solidFill>
-                <a:tailEnd type="arrow"/>
-              </a:ln>
-            </p:spPr>
-            <p:style>
-              <a:lnRef idx="2">
-                <a:schemeClr val="accent1"/>
-              </a:lnRef>
-              <a:fillRef idx="0">
-                <a:schemeClr val="accent1"/>
-              </a:fillRef>
-              <a:effectRef idx="1">
-                <a:schemeClr val="accent1"/>
-              </a:effectRef>
-              <a:fontRef idx="minor">
-                <a:schemeClr val="tx1"/>
-              </a:fontRef>
-            </p:style>
-          </p:cxnSp>
-        </p:grpSp>
-        <p:sp>
-          <p:nvSpPr>
-            <p:cNvPr id="28" name="TextBox 27">
-              <a:extLst>
-                <a:ext uri="{FF2B5EF4-FFF2-40B4-BE49-F238E27FC236}">
-                  <a16:creationId xmlns:a16="http://schemas.microsoft.com/office/drawing/2014/main" id="{FA727133-D6B4-1578-468B-5C164CF6064F}"/>
-                </a:ext>
-              </a:extLst>
-            </p:cNvPr>
-            <p:cNvSpPr txBox="1"/>
-            <p:nvPr/>
-          </p:nvSpPr>
-          <p:spPr>
-            <a:xfrm>
-              <a:off x="9041714" y="3429000"/>
-              <a:ext cx="288862" cy="369332"/>
-            </a:xfrm>
-            <a:prstGeom prst="rect">
-              <a:avLst/>
-            </a:prstGeom>
-            <a:noFill/>
-          </p:spPr>
-          <p:txBody>
-            <a:bodyPr wrap="none" rtlCol="0">
-              <a:spAutoFit/>
-            </a:bodyPr>
-            <a:lstStyle/>
-            <a:p>
-              <a:r>
-                <a:rPr lang="en-US" dirty="0">
-                  <a:solidFill>
-                    <a:srgbClr val="00B0F0"/>
-                  </a:solidFill>
-                </a:rPr>
-                <a:t>y</a:t>
-              </a:r>
-            </a:p>
-          </p:txBody>
-        </p:sp>
-        <p:sp>
-          <p:nvSpPr>
-            <p:cNvPr id="29" name="TextBox 28">
-              <a:extLst>
-                <a:ext uri="{FF2B5EF4-FFF2-40B4-BE49-F238E27FC236}">
-                  <a16:creationId xmlns:a16="http://schemas.microsoft.com/office/drawing/2014/main" id="{70EDFAA1-46FF-CB31-372E-35E2351A9A4E}"/>
-                </a:ext>
-              </a:extLst>
-            </p:cNvPr>
-            <p:cNvSpPr txBox="1"/>
-            <p:nvPr/>
-          </p:nvSpPr>
-          <p:spPr>
-            <a:xfrm>
-              <a:off x="9307595" y="3830662"/>
-              <a:ext cx="287258" cy="369332"/>
-            </a:xfrm>
-            <a:prstGeom prst="rect">
-              <a:avLst/>
-            </a:prstGeom>
-            <a:noFill/>
-          </p:spPr>
-          <p:txBody>
-            <a:bodyPr wrap="none" rtlCol="0">
-              <a:spAutoFit/>
-            </a:bodyPr>
-            <a:lstStyle/>
-            <a:p>
-              <a:r>
-                <a:rPr lang="en-US" dirty="0">
-                  <a:solidFill>
-                    <a:srgbClr val="00B0F0"/>
-                  </a:solidFill>
-                </a:rPr>
-                <a:t>x</a:t>
-              </a:r>
-            </a:p>
-          </p:txBody>
-        </p:sp>
-        <p:sp>
-          <p:nvSpPr>
-            <p:cNvPr id="30" name="TextBox 29">
-              <a:extLst>
-                <a:ext uri="{FF2B5EF4-FFF2-40B4-BE49-F238E27FC236}">
-                  <a16:creationId xmlns:a16="http://schemas.microsoft.com/office/drawing/2014/main" id="{B378A719-558C-81EF-810E-B474F1236D01}"/>
-                </a:ext>
-              </a:extLst>
-            </p:cNvPr>
-            <p:cNvSpPr txBox="1"/>
-            <p:nvPr/>
-          </p:nvSpPr>
-          <p:spPr>
-            <a:xfrm>
-              <a:off x="8619563" y="4048711"/>
-              <a:ext cx="285656" cy="369332"/>
-            </a:xfrm>
-            <a:prstGeom prst="rect">
-              <a:avLst/>
-            </a:prstGeom>
-            <a:noFill/>
-          </p:spPr>
-          <p:txBody>
-            <a:bodyPr wrap="none" rtlCol="0">
-              <a:spAutoFit/>
-            </a:bodyPr>
-            <a:lstStyle/>
-            <a:p>
-              <a:r>
-                <a:rPr lang="en-US" dirty="0">
-                  <a:solidFill>
-                    <a:srgbClr val="00B0F0"/>
-                  </a:solidFill>
-                </a:rPr>
-                <a:t>z</a:t>
-              </a:r>
-            </a:p>
-          </p:txBody>
-        </p:sp>
-      </p:grpSp>
+              </a:rPr>
+              <a:t>z</a:t>
+            </a:r>
+          </a:p>
+        </p:txBody>
+      </p:sp>
       <p:sp>
         <p:nvSpPr>
           <p:cNvPr id="8" name="Cube 7">
@@ -4489,7 +4449,7 @@
         <p:spPr>
           <a:xfrm>
             <a:off x="10770831" y="297039"/>
-            <a:ext cx="417615" cy="276999"/>
+            <a:ext cx="514885" cy="276999"/>
           </a:xfrm>
           <a:prstGeom prst="rect">
             <a:avLst/>
@@ -4502,6 +4462,46 @@
           </a:bodyPr>
           <a:lstStyle/>
           <a:p>
+            <a:r>
+              <a:rPr lang="en-US" sz="1200" dirty="0">
+                <a:solidFill>
+                  <a:schemeClr val="bg1"/>
+                </a:solidFill>
+              </a:rPr>
+              <a:t>Back</a:t>
+            </a:r>
+          </a:p>
+        </p:txBody>
+      </p:sp>
+      <p:sp>
+        <p:nvSpPr>
+          <p:cNvPr id="12" name="TextBox 11">
+            <a:extLst>
+              <a:ext uri="{FF2B5EF4-FFF2-40B4-BE49-F238E27FC236}">
+                <a16:creationId xmlns:a16="http://schemas.microsoft.com/office/drawing/2014/main" id="{EDEA84BE-24C1-130A-9DC8-2DCF25971026}"/>
+              </a:ext>
+            </a:extLst>
+          </p:cNvPr>
+          <p:cNvSpPr txBox="1"/>
+          <p:nvPr/>
+        </p:nvSpPr>
+        <p:spPr>
+          <a:xfrm>
+            <a:off x="10562023" y="1099366"/>
+            <a:ext cx="417615" cy="276999"/>
+          </a:xfrm>
+          <a:prstGeom prst="rect">
+            <a:avLst/>
+          </a:prstGeom>
+          <a:noFill/>
+        </p:spPr>
+        <p:txBody>
+          <a:bodyPr wrap="none" rtlCol="0">
+            <a:spAutoFit/>
+          </a:bodyPr>
+          <a:lstStyle/>
+          <a:p>
+            <a:pPr algn="ctr"/>
             <a:r>
               <a:rPr lang="en-US" sz="1200" dirty="0">
                 <a:solidFill>
@@ -4515,46 +4515,6 @@
       </p:sp>
       <p:sp>
         <p:nvSpPr>
-          <p:cNvPr id="12" name="TextBox 11">
-            <a:extLst>
-              <a:ext uri="{FF2B5EF4-FFF2-40B4-BE49-F238E27FC236}">
-                <a16:creationId xmlns:a16="http://schemas.microsoft.com/office/drawing/2014/main" id="{EDEA84BE-24C1-130A-9DC8-2DCF25971026}"/>
-              </a:ext>
-            </a:extLst>
-          </p:cNvPr>
-          <p:cNvSpPr txBox="1"/>
-          <p:nvPr/>
-        </p:nvSpPr>
-        <p:spPr>
-          <a:xfrm>
-            <a:off x="10504699" y="1099366"/>
-            <a:ext cx="532262" cy="276999"/>
-          </a:xfrm>
-          <a:prstGeom prst="rect">
-            <a:avLst/>
-          </a:prstGeom>
-          <a:noFill/>
-        </p:spPr>
-        <p:txBody>
-          <a:bodyPr wrap="none" rtlCol="0">
-            <a:spAutoFit/>
-          </a:bodyPr>
-          <a:lstStyle/>
-          <a:p>
-            <a:pPr algn="ctr"/>
-            <a:r>
-              <a:rPr lang="en-US" sz="1200" dirty="0">
-                <a:solidFill>
-                  <a:schemeClr val="bg1"/>
-                </a:solidFill>
-              </a:rPr>
-              <a:t>Front</a:t>
-            </a:r>
-          </a:p>
-        </p:txBody>
-      </p:sp>
-      <p:sp>
-        <p:nvSpPr>
           <p:cNvPr id="16" name="TextBox 15">
             <a:extLst>
               <a:ext uri="{FF2B5EF4-FFF2-40B4-BE49-F238E27FC236}">
@@ -4607,7 +4567,7 @@
         </p:nvSpPr>
         <p:spPr>
           <a:xfrm>
-            <a:off x="3044281" y="2954931"/>
+            <a:off x="3128058" y="2976296"/>
             <a:ext cx="821059" cy="369332"/>
           </a:xfrm>
           <a:prstGeom prst="rect">
@@ -4637,13 +4597,15 @@
               </a:ext>
             </a:extLst>
           </p:cNvPr>
-          <p:cNvCxnSpPr/>
+          <p:cNvCxnSpPr>
+            <a:cxnSpLocks/>
+          </p:cNvCxnSpPr>
           <p:nvPr/>
         </p:nvCxnSpPr>
         <p:spPr>
           <a:xfrm>
-            <a:off x="3698240" y="3329236"/>
-            <a:ext cx="957205" cy="619711"/>
+            <a:off x="3949117" y="3283687"/>
+            <a:ext cx="1315033" cy="272313"/>
           </a:xfrm>
           <a:prstGeom prst="straightConnector1">
             <a:avLst/>
@@ -4733,7 +4695,7 @@
         </p:blipFill>
         <p:spPr>
           <a:xfrm>
-            <a:off x="7614939" y="2059271"/>
+            <a:off x="7334093" y="1974786"/>
             <a:ext cx="2183689" cy="2496639"/>
           </a:xfrm>
           <a:prstGeom prst="rect">

</xml_diff>